<commit_message>
ember, index 일부 수정
</commit_message>
<xml_diff>
--- a/스토리보드/member_김현준.pptx
+++ b/스토리보드/member_김현준.pptx
@@ -251,7 +251,7 @@
           <a:p>
             <a:fld id="{2A12CD16-C69D-4F3A-B53F-2EBE7CFC0CF4}" type="datetimeFigureOut">
               <a:rPr lang="ko-KR" altLang="en-US" smtClean="0"/>
-              <a:t>2023-03-24</a:t>
+              <a:t>2023-03-30</a:t>
             </a:fld>
             <a:endParaRPr lang="ko-KR" altLang="en-US"/>
           </a:p>
@@ -421,7 +421,7 @@
           <a:p>
             <a:fld id="{2A12CD16-C69D-4F3A-B53F-2EBE7CFC0CF4}" type="datetimeFigureOut">
               <a:rPr lang="ko-KR" altLang="en-US" smtClean="0"/>
-              <a:t>2023-03-24</a:t>
+              <a:t>2023-03-30</a:t>
             </a:fld>
             <a:endParaRPr lang="ko-KR" altLang="en-US"/>
           </a:p>
@@ -601,7 +601,7 @@
           <a:p>
             <a:fld id="{2A12CD16-C69D-4F3A-B53F-2EBE7CFC0CF4}" type="datetimeFigureOut">
               <a:rPr lang="ko-KR" altLang="en-US" smtClean="0"/>
-              <a:t>2023-03-24</a:t>
+              <a:t>2023-03-30</a:t>
             </a:fld>
             <a:endParaRPr lang="ko-KR" altLang="en-US"/>
           </a:p>
@@ -771,7 +771,7 @@
           <a:p>
             <a:fld id="{2A12CD16-C69D-4F3A-B53F-2EBE7CFC0CF4}" type="datetimeFigureOut">
               <a:rPr lang="ko-KR" altLang="en-US" smtClean="0"/>
-              <a:t>2023-03-24</a:t>
+              <a:t>2023-03-30</a:t>
             </a:fld>
             <a:endParaRPr lang="ko-KR" altLang="en-US"/>
           </a:p>
@@ -1017,7 +1017,7 @@
           <a:p>
             <a:fld id="{2A12CD16-C69D-4F3A-B53F-2EBE7CFC0CF4}" type="datetimeFigureOut">
               <a:rPr lang="ko-KR" altLang="en-US" smtClean="0"/>
-              <a:t>2023-03-24</a:t>
+              <a:t>2023-03-30</a:t>
             </a:fld>
             <a:endParaRPr lang="ko-KR" altLang="en-US"/>
           </a:p>
@@ -1249,7 +1249,7 @@
           <a:p>
             <a:fld id="{2A12CD16-C69D-4F3A-B53F-2EBE7CFC0CF4}" type="datetimeFigureOut">
               <a:rPr lang="ko-KR" altLang="en-US" smtClean="0"/>
-              <a:t>2023-03-24</a:t>
+              <a:t>2023-03-30</a:t>
             </a:fld>
             <a:endParaRPr lang="ko-KR" altLang="en-US"/>
           </a:p>
@@ -1616,7 +1616,7 @@
           <a:p>
             <a:fld id="{2A12CD16-C69D-4F3A-B53F-2EBE7CFC0CF4}" type="datetimeFigureOut">
               <a:rPr lang="ko-KR" altLang="en-US" smtClean="0"/>
-              <a:t>2023-03-24</a:t>
+              <a:t>2023-03-30</a:t>
             </a:fld>
             <a:endParaRPr lang="ko-KR" altLang="en-US"/>
           </a:p>
@@ -1734,7 +1734,7 @@
           <a:p>
             <a:fld id="{2A12CD16-C69D-4F3A-B53F-2EBE7CFC0CF4}" type="datetimeFigureOut">
               <a:rPr lang="ko-KR" altLang="en-US" smtClean="0"/>
-              <a:t>2023-03-24</a:t>
+              <a:t>2023-03-30</a:t>
             </a:fld>
             <a:endParaRPr lang="ko-KR" altLang="en-US"/>
           </a:p>
@@ -1829,7 +1829,7 @@
           <a:p>
             <a:fld id="{2A12CD16-C69D-4F3A-B53F-2EBE7CFC0CF4}" type="datetimeFigureOut">
               <a:rPr lang="ko-KR" altLang="en-US" smtClean="0"/>
-              <a:t>2023-03-24</a:t>
+              <a:t>2023-03-30</a:t>
             </a:fld>
             <a:endParaRPr lang="ko-KR" altLang="en-US"/>
           </a:p>
@@ -2106,7 +2106,7 @@
           <a:p>
             <a:fld id="{2A12CD16-C69D-4F3A-B53F-2EBE7CFC0CF4}" type="datetimeFigureOut">
               <a:rPr lang="ko-KR" altLang="en-US" smtClean="0"/>
-              <a:t>2023-03-24</a:t>
+              <a:t>2023-03-30</a:t>
             </a:fld>
             <a:endParaRPr lang="ko-KR" altLang="en-US"/>
           </a:p>
@@ -2359,7 +2359,7 @@
           <a:p>
             <a:fld id="{2A12CD16-C69D-4F3A-B53F-2EBE7CFC0CF4}" type="datetimeFigureOut">
               <a:rPr lang="ko-KR" altLang="en-US" smtClean="0"/>
-              <a:t>2023-03-24</a:t>
+              <a:t>2023-03-30</a:t>
             </a:fld>
             <a:endParaRPr lang="ko-KR" altLang="en-US"/>
           </a:p>
@@ -2572,7 +2572,7 @@
           <a:p>
             <a:fld id="{2A12CD16-C69D-4F3A-B53F-2EBE7CFC0CF4}" type="datetimeFigureOut">
               <a:rPr lang="ko-KR" altLang="en-US" smtClean="0"/>
-              <a:t>2023-03-24</a:t>
+              <a:t>2023-03-30</a:t>
             </a:fld>
             <a:endParaRPr lang="ko-KR" altLang="en-US"/>
           </a:p>
@@ -3951,11 +3951,7 @@
                       </a:r>
                       <a:r>
                         <a:rPr lang="ko-KR" altLang="en-US" sz="900" dirty="0" smtClean="0"/>
-                        <a:t>계정 </a:t>
-                      </a:r>
-                      <a:r>
-                        <a:rPr lang="ko-KR" altLang="en-US" sz="900" dirty="0" smtClean="0"/>
-                        <a:t>연동</a:t>
+                        <a:t>계정 연동</a:t>
                       </a:r>
                       <a:endParaRPr lang="en-US" altLang="ko-KR" sz="900" dirty="0" smtClean="0"/>
                     </a:p>
@@ -9530,7 +9526,7 @@
           <p:nvPr>
             <p:extLst>
               <p:ext uri="{D42A27DB-BD31-4B8C-83A1-F6EECF244321}">
-                <p14:modId xmlns:p14="http://schemas.microsoft.com/office/powerpoint/2010/main" val="3293778948"/>
+                <p14:modId xmlns:p14="http://schemas.microsoft.com/office/powerpoint/2010/main" val="1640086642"/>
               </p:ext>
             </p:extLst>
           </p:nvPr>
@@ -10312,7 +10308,23 @@
                       </a:pPr>
                       <a:r>
                         <a:rPr lang="ko-KR" altLang="en-US" sz="700" baseline="0" dirty="0" smtClean="0"/>
-                        <a:t>자격 증명을 위한 파일 첨부</a:t>
+                        <a:t>자격 증명을 위한 파일 </a:t>
+                      </a:r>
+                      <a:r>
+                        <a:rPr lang="ko-KR" altLang="en-US" sz="700" baseline="0" dirty="0" smtClean="0"/>
+                        <a:t>첨부</a:t>
+                      </a:r>
+                      <a:r>
+                        <a:rPr lang="en-US" altLang="ko-KR" sz="700" baseline="0" dirty="0" smtClean="0"/>
+                        <a:t>(2</a:t>
+                      </a:r>
+                      <a:r>
+                        <a:rPr lang="ko-KR" altLang="en-US" sz="700" baseline="0" dirty="0" smtClean="0"/>
+                        <a:t>차</a:t>
+                      </a:r>
+                      <a:r>
+                        <a:rPr lang="en-US" altLang="ko-KR" sz="700" baseline="0" dirty="0" smtClean="0"/>
+                        <a:t>)</a:t>
                       </a:r>
                       <a:endParaRPr lang="en-US" altLang="ko-KR" sz="700" baseline="0" dirty="0" smtClean="0"/>
                     </a:p>
@@ -19640,7 +19652,7 @@
           <p:nvPr>
             <p:extLst>
               <p:ext uri="{D42A27DB-BD31-4B8C-83A1-F6EECF244321}">
-                <p14:modId xmlns:p14="http://schemas.microsoft.com/office/powerpoint/2010/main" val="1323620709"/>
+                <p14:modId xmlns:p14="http://schemas.microsoft.com/office/powerpoint/2010/main" val="385591055"/>
               </p:ext>
             </p:extLst>
           </p:nvPr>
@@ -20738,7 +20750,23 @@
                       </a:r>
                       <a:r>
                         <a:rPr lang="ko-KR" altLang="en-US" sz="800" dirty="0" smtClean="0"/>
-                        <a:t>를 이용해 달력에 표시</a:t>
+                        <a:t>를 이용해 달력에 </a:t>
+                      </a:r>
+                      <a:r>
+                        <a:rPr lang="ko-KR" altLang="en-US" sz="800" dirty="0" smtClean="0"/>
+                        <a:t>표시</a:t>
+                      </a:r>
+                      <a:r>
+                        <a:rPr lang="en-US" altLang="ko-KR" sz="800" dirty="0" smtClean="0"/>
+                        <a:t>(2</a:t>
+                      </a:r>
+                      <a:r>
+                        <a:rPr lang="ko-KR" altLang="en-US" sz="800" dirty="0" smtClean="0"/>
+                        <a:t>차</a:t>
+                      </a:r>
+                      <a:r>
+                        <a:rPr lang="en-US" altLang="ko-KR" sz="800" dirty="0" smtClean="0"/>
+                        <a:t>)</a:t>
                       </a:r>
                       <a:endParaRPr lang="en-US" altLang="ko-KR" sz="800" dirty="0" smtClean="0"/>
                     </a:p>
@@ -20777,7 +20805,23 @@
                       </a:r>
                       <a:r>
                         <a:rPr lang="ko-KR" altLang="en-US" sz="800" dirty="0" smtClean="0"/>
-                        <a:t> 출력</a:t>
+                        <a:t> </a:t>
+                      </a:r>
+                      <a:r>
+                        <a:rPr lang="ko-KR" altLang="en-US" sz="800" dirty="0" smtClean="0"/>
+                        <a:t>출력</a:t>
+                      </a:r>
+                      <a:r>
+                        <a:rPr lang="en-US" altLang="ko-KR" sz="800" dirty="0" smtClean="0"/>
+                        <a:t>(2</a:t>
+                      </a:r>
+                      <a:r>
+                        <a:rPr lang="ko-KR" altLang="en-US" sz="800" dirty="0" smtClean="0"/>
+                        <a:t>차</a:t>
+                      </a:r>
+                      <a:r>
+                        <a:rPr lang="en-US" altLang="ko-KR" sz="800" dirty="0" smtClean="0"/>
+                        <a:t>)</a:t>
                       </a:r>
                       <a:endParaRPr lang="ko-KR" altLang="en-US" sz="800" dirty="0"/>
                     </a:p>
@@ -20923,8 +20967,12 @@
                         <a:t>질병명</a:t>
                       </a:r>
                       <a:r>
-                        <a:rPr lang="ko-KR" altLang="en-US" sz="800" baseline="0" dirty="0" smtClean="0"/>
-                        <a:t> 추가하기</a:t>
+                        <a:rPr lang="ko-KR" altLang="en-US" sz="800" baseline="0" smtClean="0"/>
+                        <a:t> </a:t>
+                      </a:r>
+                      <a:r>
+                        <a:rPr lang="ko-KR" altLang="en-US" sz="800" baseline="0" smtClean="0"/>
+                        <a:t>추가하기</a:t>
                       </a:r>
                       <a:endParaRPr lang="ko-KR" altLang="en-US" sz="800" dirty="0"/>
                     </a:p>

</xml_diff>